<commit_message>
updated PowerPoint copyright to 2016
</commit_message>
<xml_diff>
--- a/Presentation/PowerPoint/template.pptx
+++ b/Presentation/PowerPoint/template.pptx
@@ -236,7 +236,7 @@
             <a:fld id="{5F993C83-2184-4286-ABE1-941A40B40C8F}" type="datetimeFigureOut">
               <a:rPr lang="en-US" smtClean="0"/>
               <a:pPr/>
-              <a:t>12/31/2015</a:t>
+              <a:t>1/26/2016</a:t>
             </a:fld>
             <a:endParaRPr lang="en-US"/>
           </a:p>
@@ -403,7 +403,7 @@
             <a:fld id="{6053241F-7ED4-45AC-844C-15DB0D5F9CCD}" type="datetimeFigureOut">
               <a:rPr lang="en-US" smtClean="0"/>
               <a:pPr/>
-              <a:t>12/31/2015</a:t>
+              <a:t>1/26/2016</a:t>
             </a:fld>
             <a:endParaRPr lang="en-US"/>
           </a:p>
@@ -900,7 +900,27 @@
                 <a:latin typeface="Arial" pitchFamily="34" charset="0"/>
                 <a:cs typeface="Arial" pitchFamily="34" charset="0"/>
               </a:rPr>
-              <a:t>© 2015 The MathWorks, Inc.</a:t>
+              <a:t>© </a:t>
+            </a:r>
+            <a:r>
+              <a:rPr lang="en-US" sz="1003" dirty="0" smtClean="0">
+                <a:solidFill>
+                  <a:schemeClr val="bg1"/>
+                </a:solidFill>
+                <a:latin typeface="Arial" pitchFamily="34" charset="0"/>
+                <a:cs typeface="Arial" pitchFamily="34" charset="0"/>
+              </a:rPr>
+              <a:t>2016 </a:t>
+            </a:r>
+            <a:r>
+              <a:rPr lang="en-US" sz="1003" dirty="0" smtClean="0">
+                <a:solidFill>
+                  <a:schemeClr val="bg1"/>
+                </a:solidFill>
+                <a:latin typeface="Arial" pitchFamily="34" charset="0"/>
+                <a:cs typeface="Arial" pitchFamily="34" charset="0"/>
+              </a:rPr>
+              <a:t>The MathWorks, Inc.</a:t>
             </a:r>
             <a:endParaRPr lang="en-US" sz="1003" dirty="0">
               <a:solidFill>
@@ -5497,11 +5517,11 @@
   <p:clrMapOvr>
     <a:masterClrMapping/>
   </p:clrMapOvr>
-  <mc:AlternateContent xmlns:mc="http://schemas.openxmlformats.org/markup-compatibility/2006">
-    <mc:Choice xmlns:p14="http://schemas.microsoft.com/office/powerpoint/2010/main" Requires="p14">
+  <mc:AlternateContent xmlns:mc="http://schemas.openxmlformats.org/markup-compatibility/2006" xmlns:p14="http://schemas.microsoft.com/office/powerpoint/2010/main">
+    <mc:Choice Requires="p14">
       <p:transition spd="slow" p14:dur="2000"/>
     </mc:Choice>
-    <mc:Fallback>
+    <mc:Fallback xmlns="">
       <p:transition spd="slow"/>
     </mc:Fallback>
   </mc:AlternateContent>

</xml_diff>